<commit_message>
Fix some colors. Publish version 1.1.0.88.
</commit_message>
<xml_diff>
--- a/Source/WPF/MyMoney/Icons/Icon.pptx
+++ b/Source/WPF/MyMoney/Icons/Icon.pptx
@@ -6,6 +6,7 @@
   </p:sldMasterIdLst>
   <p:sldIdLst>
     <p:sldId id="256" r:id="rId2"/>
+    <p:sldId id="257" r:id="rId3"/>
   </p:sldIdLst>
   <p:sldSz cx="12192000" cy="6858000"/>
   <p:notesSz cx="6858000" cy="9144000"/>
@@ -104,6 +105,11 @@
       </a:defRPr>
     </a:lvl9pPr>
   </p:defaultTextStyle>
+  <p:extLst>
+    <p:ext uri="{EFAFB233-063F-42B5-8137-9DF3F51BA10A}">
+      <p15:sldGuideLst xmlns:p15="http://schemas.microsoft.com/office/powerpoint/2012/main"/>
+    </p:ext>
+  </p:extLst>
 </p:presentation>
 </file>
 
@@ -254,7 +260,7 @@
           <a:p>
             <a:fld id="{E526C7DD-2DA4-44E6-8312-B94AEE9AEF76}" type="datetimeFigureOut">
               <a:rPr lang="en-US" smtClean="0"/>
-              <a:t>5/25/2020</a:t>
+              <a:t>2/18/2022</a:t>
             </a:fld>
             <a:endParaRPr lang="en-US"/>
           </a:p>
@@ -452,7 +458,7 @@
           <a:p>
             <a:fld id="{E526C7DD-2DA4-44E6-8312-B94AEE9AEF76}" type="datetimeFigureOut">
               <a:rPr lang="en-US" smtClean="0"/>
-              <a:t>5/25/2020</a:t>
+              <a:t>2/18/2022</a:t>
             </a:fld>
             <a:endParaRPr lang="en-US"/>
           </a:p>
@@ -660,7 +666,7 @@
           <a:p>
             <a:fld id="{E526C7DD-2DA4-44E6-8312-B94AEE9AEF76}" type="datetimeFigureOut">
               <a:rPr lang="en-US" smtClean="0"/>
-              <a:t>5/25/2020</a:t>
+              <a:t>2/18/2022</a:t>
             </a:fld>
             <a:endParaRPr lang="en-US"/>
           </a:p>
@@ -858,7 +864,7 @@
           <a:p>
             <a:fld id="{E526C7DD-2DA4-44E6-8312-B94AEE9AEF76}" type="datetimeFigureOut">
               <a:rPr lang="en-US" smtClean="0"/>
-              <a:t>5/25/2020</a:t>
+              <a:t>2/18/2022</a:t>
             </a:fld>
             <a:endParaRPr lang="en-US"/>
           </a:p>
@@ -1133,7 +1139,7 @@
           <a:p>
             <a:fld id="{E526C7DD-2DA4-44E6-8312-B94AEE9AEF76}" type="datetimeFigureOut">
               <a:rPr lang="en-US" smtClean="0"/>
-              <a:t>5/25/2020</a:t>
+              <a:t>2/18/2022</a:t>
             </a:fld>
             <a:endParaRPr lang="en-US"/>
           </a:p>
@@ -1398,7 +1404,7 @@
           <a:p>
             <a:fld id="{E526C7DD-2DA4-44E6-8312-B94AEE9AEF76}" type="datetimeFigureOut">
               <a:rPr lang="en-US" smtClean="0"/>
-              <a:t>5/25/2020</a:t>
+              <a:t>2/18/2022</a:t>
             </a:fld>
             <a:endParaRPr lang="en-US"/>
           </a:p>
@@ -1810,7 +1816,7 @@
           <a:p>
             <a:fld id="{E526C7DD-2DA4-44E6-8312-B94AEE9AEF76}" type="datetimeFigureOut">
               <a:rPr lang="en-US" smtClean="0"/>
-              <a:t>5/25/2020</a:t>
+              <a:t>2/18/2022</a:t>
             </a:fld>
             <a:endParaRPr lang="en-US"/>
           </a:p>
@@ -1951,7 +1957,7 @@
           <a:p>
             <a:fld id="{E526C7DD-2DA4-44E6-8312-B94AEE9AEF76}" type="datetimeFigureOut">
               <a:rPr lang="en-US" smtClean="0"/>
-              <a:t>5/25/2020</a:t>
+              <a:t>2/18/2022</a:t>
             </a:fld>
             <a:endParaRPr lang="en-US"/>
           </a:p>
@@ -2064,7 +2070,7 @@
           <a:p>
             <a:fld id="{E526C7DD-2DA4-44E6-8312-B94AEE9AEF76}" type="datetimeFigureOut">
               <a:rPr lang="en-US" smtClean="0"/>
-              <a:t>5/25/2020</a:t>
+              <a:t>2/18/2022</a:t>
             </a:fld>
             <a:endParaRPr lang="en-US"/>
           </a:p>
@@ -2375,7 +2381,7 @@
           <a:p>
             <a:fld id="{E526C7DD-2DA4-44E6-8312-B94AEE9AEF76}" type="datetimeFigureOut">
               <a:rPr lang="en-US" smtClean="0"/>
-              <a:t>5/25/2020</a:t>
+              <a:t>2/18/2022</a:t>
             </a:fld>
             <a:endParaRPr lang="en-US"/>
           </a:p>
@@ -2663,7 +2669,7 @@
           <a:p>
             <a:fld id="{E526C7DD-2DA4-44E6-8312-B94AEE9AEF76}" type="datetimeFigureOut">
               <a:rPr lang="en-US" smtClean="0"/>
-              <a:t>5/25/2020</a:t>
+              <a:t>2/18/2022</a:t>
             </a:fld>
             <a:endParaRPr lang="en-US"/>
           </a:p>
@@ -2904,7 +2910,7 @@
           <a:p>
             <a:fld id="{E526C7DD-2DA4-44E6-8312-B94AEE9AEF76}" type="datetimeFigureOut">
               <a:rPr lang="en-US" smtClean="0"/>
-              <a:t>5/25/2020</a:t>
+              <a:t>2/18/2022</a:t>
             </a:fld>
             <a:endParaRPr lang="en-US"/>
           </a:p>
@@ -4725,6 +4731,171 @@
 </p:sld>
 </file>
 
+<file path=ppt/slides/slide2.xml><?xml version="1.0" encoding="utf-8"?>
+<p:sld xmlns:a="http://schemas.openxmlformats.org/drawingml/2006/main" xmlns:r="http://schemas.openxmlformats.org/officeDocument/2006/relationships" xmlns:p="http://schemas.openxmlformats.org/presentationml/2006/main">
+  <p:cSld>
+    <p:spTree>
+      <p:nvGrpSpPr>
+        <p:cNvPr id="1" name=""/>
+        <p:cNvGrpSpPr/>
+        <p:nvPr/>
+      </p:nvGrpSpPr>
+      <p:grpSpPr>
+        <a:xfrm>
+          <a:off x="0" y="0"/>
+          <a:ext cx="0" cy="0"/>
+          <a:chOff x="0" y="0"/>
+          <a:chExt cx="0" cy="0"/>
+        </a:xfrm>
+      </p:grpSpPr>
+      <p:grpSp>
+        <p:nvGrpSpPr>
+          <p:cNvPr id="4" name="Group 3">
+            <a:extLst>
+              <a:ext uri="{FF2B5EF4-FFF2-40B4-BE49-F238E27FC236}">
+                <a16:creationId xmlns:a16="http://schemas.microsoft.com/office/drawing/2014/main" id="{D1ECA752-0DF3-47D0-B914-24F1DDD7BB26}"/>
+              </a:ext>
+            </a:extLst>
+          </p:cNvPr>
+          <p:cNvGrpSpPr/>
+          <p:nvPr/>
+        </p:nvGrpSpPr>
+        <p:grpSpPr>
+          <a:xfrm>
+            <a:off x="3455469" y="2521819"/>
+            <a:ext cx="2541070" cy="2454442"/>
+            <a:chOff x="3455469" y="2521819"/>
+            <a:chExt cx="2541070" cy="2454442"/>
+          </a:xfrm>
+        </p:grpSpPr>
+        <p:sp>
+          <p:nvSpPr>
+            <p:cNvPr id="2" name="Circle: Hollow 1">
+              <a:extLst>
+                <a:ext uri="{FF2B5EF4-FFF2-40B4-BE49-F238E27FC236}">
+                  <a16:creationId xmlns:a16="http://schemas.microsoft.com/office/drawing/2014/main" id="{BDA13DE1-6BCD-4156-A32D-BE30AF3618F2}"/>
+                </a:ext>
+              </a:extLst>
+            </p:cNvPr>
+            <p:cNvSpPr/>
+            <p:nvPr/>
+          </p:nvSpPr>
+          <p:spPr>
+            <a:xfrm>
+              <a:off x="3455469" y="2521819"/>
+              <a:ext cx="2541070" cy="2454442"/>
+            </a:xfrm>
+            <a:prstGeom prst="donut">
+              <a:avLst>
+                <a:gd name="adj" fmla="val 10098"/>
+              </a:avLst>
+            </a:prstGeom>
+            <a:solidFill>
+              <a:schemeClr val="accent1">
+                <a:alpha val="48000"/>
+              </a:schemeClr>
+            </a:solidFill>
+            <a:ln>
+              <a:noFill/>
+            </a:ln>
+          </p:spPr>
+          <p:style>
+            <a:lnRef idx="2">
+              <a:schemeClr val="accent1">
+                <a:shade val="50000"/>
+              </a:schemeClr>
+            </a:lnRef>
+            <a:fillRef idx="1">
+              <a:schemeClr val="accent1"/>
+            </a:fillRef>
+            <a:effectRef idx="0">
+              <a:schemeClr val="accent1"/>
+            </a:effectRef>
+            <a:fontRef idx="minor">
+              <a:schemeClr val="lt1"/>
+            </a:fontRef>
+          </p:style>
+          <p:txBody>
+            <a:bodyPr rtlCol="0" anchor="ctr"/>
+            <a:lstStyle/>
+            <a:p>
+              <a:pPr algn="ctr"/>
+              <a:endParaRPr lang="en-US">
+                <a:solidFill>
+                  <a:schemeClr val="tx1"/>
+                </a:solidFill>
+              </a:endParaRPr>
+            </a:p>
+          </p:txBody>
+        </p:sp>
+        <p:sp>
+          <p:nvSpPr>
+            <p:cNvPr id="3" name="Isosceles Triangle 2">
+              <a:extLst>
+                <a:ext uri="{FF2B5EF4-FFF2-40B4-BE49-F238E27FC236}">
+                  <a16:creationId xmlns:a16="http://schemas.microsoft.com/office/drawing/2014/main" id="{65B0EBB6-9E44-488E-92A7-1AA24CD4205E}"/>
+                </a:ext>
+              </a:extLst>
+            </p:cNvPr>
+            <p:cNvSpPr/>
+            <p:nvPr/>
+          </p:nvSpPr>
+          <p:spPr>
+            <a:xfrm rot="5400000">
+              <a:off x="4312117" y="3325528"/>
+              <a:ext cx="1106905" cy="847023"/>
+            </a:xfrm>
+            <a:prstGeom prst="triangle">
+              <a:avLst/>
+            </a:prstGeom>
+            <a:solidFill>
+              <a:schemeClr val="accent1">
+                <a:alpha val="48000"/>
+              </a:schemeClr>
+            </a:solidFill>
+            <a:ln>
+              <a:noFill/>
+            </a:ln>
+          </p:spPr>
+          <p:style>
+            <a:lnRef idx="2">
+              <a:schemeClr val="accent1">
+                <a:shade val="50000"/>
+              </a:schemeClr>
+            </a:lnRef>
+            <a:fillRef idx="1">
+              <a:schemeClr val="accent1"/>
+            </a:fillRef>
+            <a:effectRef idx="0">
+              <a:schemeClr val="accent1"/>
+            </a:effectRef>
+            <a:fontRef idx="minor">
+              <a:schemeClr val="lt1"/>
+            </a:fontRef>
+          </p:style>
+          <p:txBody>
+            <a:bodyPr rtlCol="0" anchor="ctr"/>
+            <a:lstStyle/>
+            <a:p>
+              <a:pPr algn="ctr"/>
+              <a:endParaRPr lang="en-US"/>
+            </a:p>
+          </p:txBody>
+        </p:sp>
+      </p:grpSp>
+    </p:spTree>
+    <p:extLst>
+      <p:ext uri="{BB962C8B-B14F-4D97-AF65-F5344CB8AC3E}">
+        <p14:creationId xmlns:p14="http://schemas.microsoft.com/office/powerpoint/2010/main" val="1240373653"/>
+      </p:ext>
+    </p:extLst>
+  </p:cSld>
+  <p:clrMapOvr>
+    <a:masterClrMapping/>
+  </p:clrMapOvr>
+</p:sld>
+</file>
+
 <file path=ppt/theme/theme1.xml><?xml version="1.0" encoding="utf-8"?>
 <a:theme xmlns:a="http://schemas.openxmlformats.org/drawingml/2006/main" name="Office Theme">
   <a:themeElements>

</xml_diff>